<commit_message>
Chap 2: update samples
</commit_message>
<xml_diff>
--- a/presentations/Android Gradle 从入门到GG 1.pptx
+++ b/presentations/Android Gradle 从入门到GG 1.pptx
@@ -8066,7 +8066,7 @@
           <p:nvPr>
             <p:extLst>
               <p:ext uri="{D42A27DB-BD31-4B8C-83A1-F6EECF244321}">
-                <p14:modId xmlns:p14="http://schemas.microsoft.com/office/powerpoint/2010/main" val="3273624262"/>
+                <p14:modId xmlns:p14="http://schemas.microsoft.com/office/powerpoint/2010/main" val="282545294"/>
               </p:ext>
             </p:extLst>
           </p:nvPr>
@@ -8110,7 +8110,12 @@
                     <a:bodyPr/>
                     <a:lstStyle/>
                     <a:p>
-                      <a:endParaRPr lang="zh-CN" altLang="en-US" dirty="0"/>
+                      <a:pPr algn="ctr"/>
+                      <a:r>
+                        <a:rPr lang="en-US" altLang="zh-CN" sz="2400" dirty="0"/>
+                        <a:t>flavor</a:t>
+                      </a:r>
+                      <a:endParaRPr lang="zh-CN" altLang="en-US" sz="2400" dirty="0"/>
                     </a:p>
                   </a:txBody>
                   <a:tcPr/>
@@ -8120,7 +8125,12 @@
                     <a:bodyPr/>
                     <a:lstStyle/>
                     <a:p>
-                      <a:endParaRPr lang="zh-CN" altLang="en-US"/>
+                      <a:pPr algn="ctr"/>
+                      <a:r>
+                        <a:rPr lang="en-US" altLang="zh-CN" sz="2400" dirty="0" err="1"/>
+                        <a:t>buildType</a:t>
+                      </a:r>
+                      <a:endParaRPr lang="zh-CN" altLang="en-US" sz="2400" dirty="0"/>
                     </a:p>
                   </a:txBody>
                   <a:tcPr/>
@@ -8130,7 +8140,12 @@
                     <a:bodyPr/>
                     <a:lstStyle/>
                     <a:p>
-                      <a:endParaRPr lang="zh-CN" altLang="en-US"/>
+                      <a:pPr algn="ctr"/>
+                      <a:r>
+                        <a:rPr lang="en-US" altLang="zh-CN" sz="2400" dirty="0"/>
+                        <a:t>variant</a:t>
+                      </a:r>
+                      <a:endParaRPr lang="zh-CN" altLang="en-US" sz="2400" dirty="0"/>
                     </a:p>
                   </a:txBody>
                   <a:tcPr/>

</xml_diff>

<commit_message>
Chap 1: fix the priority error of the variant in the presentation
</commit_message>
<xml_diff>
--- a/presentations/Android Gradle 从入门到GG 1.pptx
+++ b/presentations/Android Gradle 从入门到GG 1.pptx
@@ -235,7 +235,7 @@
           <a:p>
             <a:fld id="{0F550209-2865-4062-9A66-2B6A574442D5}" type="datetimeFigureOut">
               <a:rPr lang="zh-CN" altLang="en-US" smtClean="0"/>
-              <a:t>2016/4/21</a:t>
+              <a:t>2016/4/22</a:t>
             </a:fld>
             <a:endParaRPr lang="zh-CN" altLang="en-US"/>
           </a:p>
@@ -705,7 +705,7 @@
             <a:fld id="{99E682FB-6D4D-4FEA-8B74-84865064F1D0}" type="datetime2">
               <a:rPr lang="zh-CN" altLang="en-US" smtClean="0"/>
               <a:pPr algn="ctr"/>
-              <a:t>2016年4月21日</a:t>
+              <a:t>2016年4月22日</a:t>
             </a:fld>
             <a:endParaRPr lang="en-US" altLang="zh-CN" dirty="0"/>
           </a:p>
@@ -1297,7 +1297,7 @@
             <a:fld id="{99E682FB-6D4D-4FEA-8B74-84865064F1D0}" type="datetime2">
               <a:rPr lang="zh-CN" altLang="en-US" smtClean="0"/>
               <a:pPr algn="ctr"/>
-              <a:t>2016年4月21日</a:t>
+              <a:t>2016年4月22日</a:t>
             </a:fld>
             <a:endParaRPr lang="en-US" altLang="zh-CN" dirty="0"/>
           </a:p>
@@ -1493,7 +1493,7 @@
             <a:fld id="{99E682FB-6D4D-4FEA-8B74-84865064F1D0}" type="datetime2">
               <a:rPr lang="zh-CN" altLang="en-US" smtClean="0"/>
               <a:pPr algn="ctr"/>
-              <a:t>2016年4月21日</a:t>
+              <a:t>2016年4月22日</a:t>
             </a:fld>
             <a:endParaRPr lang="en-US" altLang="zh-CN" dirty="0"/>
           </a:p>
@@ -1635,7 +1635,7 @@
           <a:p>
             <a:fld id="{530820CF-B880-4189-942D-D702A7CBA730}" type="datetimeFigureOut">
               <a:rPr lang="zh-CN" altLang="en-US" smtClean="0"/>
-              <a:t>2016/4/21</a:t>
+              <a:t>2016/4/22</a:t>
             </a:fld>
             <a:endParaRPr lang="zh-CN" altLang="en-US"/>
           </a:p>
@@ -10740,6 +10740,54 @@
               </a:rPr>
               <a:t>前面的覆盖后面的</a:t>
             </a:r>
+            <a:r>
+              <a:rPr lang="en-US" altLang="zh-CN" sz="2400" dirty="0">
+                <a:solidFill>
+                  <a:srgbClr val="FF0000"/>
+                </a:solidFill>
+              </a:rPr>
+              <a:t>, </a:t>
+            </a:r>
+            <a:r>
+              <a:rPr lang="zh-CN" altLang="en-US" sz="2400" dirty="0">
+                <a:solidFill>
+                  <a:srgbClr val="FF0000"/>
+                </a:solidFill>
+              </a:rPr>
+              <a:t>除了</a:t>
+            </a:r>
+            <a:r>
+              <a:rPr lang="en-US" altLang="zh-CN" sz="2400" dirty="0" err="1">
+                <a:solidFill>
+                  <a:srgbClr val="FF0000"/>
+                </a:solidFill>
+              </a:rPr>
+              <a:t>buildType</a:t>
+            </a:r>
+            <a:r>
+              <a:rPr lang="en-US" altLang="zh-CN" sz="2400" dirty="0">
+                <a:solidFill>
+                  <a:srgbClr val="FF0000"/>
+                </a:solidFill>
+              </a:rPr>
+              <a:t>, </a:t>
+            </a:r>
+            <a:r>
+              <a:rPr lang="zh-CN" altLang="en-US" sz="2400" dirty="0">
+                <a:solidFill>
+                  <a:srgbClr val="FF0000"/>
+                </a:solidFill>
+              </a:rPr>
+              <a:t>优先级最高的是 </a:t>
+            </a:r>
+            <a:r>
+              <a:rPr lang="en-US" altLang="zh-CN" sz="2400" dirty="0" err="1">
+                <a:solidFill>
+                  <a:srgbClr val="FF0000"/>
+                </a:solidFill>
+              </a:rPr>
+              <a:t>buildType</a:t>
+            </a:r>
             <a:endParaRPr lang="en-US" altLang="zh-CN" sz="2400" dirty="0">
               <a:solidFill>
                 <a:srgbClr val="FF0000"/>
@@ -10760,38 +10808,30 @@
               <a:t>, </a:t>
             </a:r>
             <a:r>
+              <a:rPr lang="en-US" altLang="zh-CN" sz="2400" dirty="0">
+                <a:solidFill>
+                  <a:srgbClr val="FF0000"/>
+                </a:solidFill>
+              </a:rPr>
+              <a:t>debug &gt;</a:t>
+            </a:r>
+            <a:r>
+              <a:rPr lang="en-US" altLang="zh-CN" sz="2400" dirty="0"/>
+              <a:t> </a:t>
+            </a:r>
+            <a:r>
               <a:rPr lang="en-US" altLang="zh-CN" sz="2400" dirty="0" err="1"/>
               <a:t>flyme</a:t>
             </a:r>
             <a:r>
               <a:rPr lang="en-US" altLang="zh-CN" sz="2400" dirty="0"/>
-              <a:t> &gt; free &gt; debug</a:t>
+              <a:t> &gt; free</a:t>
             </a:r>
           </a:p>
           <a:p>
             <a:r>
               <a:rPr lang="zh-CN" altLang="en-US" sz="2400" dirty="0"/>
               <a:t>即 </a:t>
-            </a:r>
-            <a:r>
-              <a:rPr lang="en-US" altLang="zh-CN" sz="2400" dirty="0"/>
-              <a:t>free/</a:t>
-            </a:r>
-            <a:r>
-              <a:rPr lang="zh-CN" altLang="en-US" sz="2400" dirty="0"/>
-              <a:t>中的同名资源会覆盖</a:t>
-            </a:r>
-            <a:r>
-              <a:rPr lang="en-US" altLang="zh-CN" sz="2400" dirty="0"/>
-              <a:t>debug/</a:t>
-            </a:r>
-            <a:r>
-              <a:rPr lang="zh-CN" altLang="en-US" sz="2400" dirty="0"/>
-              <a:t>的</a:t>
-            </a:r>
-            <a:r>
-              <a:rPr lang="en-US" altLang="zh-CN" sz="2400" dirty="0"/>
-              <a:t>, </a:t>
             </a:r>
             <a:r>
               <a:rPr lang="en-US" altLang="zh-CN" sz="2400" dirty="0" err="1"/>
@@ -10803,11 +10843,31 @@
             </a:r>
             <a:r>
               <a:rPr lang="zh-CN" altLang="en-US" sz="2400" dirty="0"/>
+              <a:t>中的同名资源会覆盖</a:t>
+            </a:r>
+            <a:r>
+              <a:rPr lang="en-US" altLang="zh-CN" sz="2400" dirty="0"/>
+              <a:t>free/</a:t>
+            </a:r>
+            <a:r>
+              <a:rPr lang="zh-CN" altLang="en-US" sz="2400" dirty="0"/>
+              <a:t>的</a:t>
+            </a:r>
+            <a:r>
+              <a:rPr lang="en-US" altLang="zh-CN" sz="2400" dirty="0"/>
+              <a:t>, debug/</a:t>
+            </a:r>
+            <a:r>
+              <a:rPr lang="zh-CN" altLang="en-US" sz="2400" dirty="0"/>
               <a:t>的会覆盖</a:t>
             </a:r>
             <a:r>
-              <a:rPr lang="en-US" altLang="zh-CN" sz="2400" dirty="0"/>
-              <a:t>free/</a:t>
+              <a:rPr lang="en-US" altLang="zh-CN" sz="2400" dirty="0" err="1"/>
+              <a:t>flyme</a:t>
+            </a:r>
+            <a:r>
+              <a:rPr lang="en-US" altLang="zh-CN" sz="2400" dirty="0"/>
+              <a:t>/</a:t>
             </a:r>
           </a:p>
           <a:p>
@@ -10859,12 +10919,24 @@
               <a:t> &lt;=&gt; </a:t>
             </a:r>
             <a:r>
+              <a:rPr lang="en-US" altLang="zh-CN" sz="2400" dirty="0">
+                <a:solidFill>
+                  <a:srgbClr val="FF0000"/>
+                </a:solidFill>
+              </a:rPr>
+              <a:t>debug &gt;</a:t>
+            </a:r>
+            <a:r>
+              <a:rPr lang="en-US" altLang="zh-CN" sz="2400" dirty="0"/>
+              <a:t> </a:t>
+            </a:r>
+            <a:r>
               <a:rPr lang="en-US" altLang="zh-CN" sz="2400" dirty="0" err="1"/>
               <a:t>flyme</a:t>
             </a:r>
             <a:r>
               <a:rPr lang="en-US" altLang="zh-CN" sz="2400" dirty="0"/>
-              <a:t> &gt; free &gt; debug &gt; main</a:t>
+              <a:t> &gt; free &gt; main</a:t>
             </a:r>
           </a:p>
         </p:txBody>
@@ -12620,7 +12692,7 @@
             <a:fld id="{99E682FB-6D4D-4FEA-8B74-84865064F1D0}" type="datetime2">
               <a:rPr lang="zh-CN" altLang="en-US" smtClean="0"/>
               <a:pPr algn="ctr"/>
-              <a:t>2016年4月21日</a:t>
+              <a:t>2016年4月22日</a:t>
             </a:fld>
             <a:endParaRPr lang="en-US" altLang="zh-CN" dirty="0"/>
           </a:p>

</xml_diff>